<commit_message>
Updated navsat information and joy information
</commit_message>
<xml_diff>
--- a/pictures/pic.pptx
+++ b/pictures/pic.pptx
@@ -7,6 +7,7 @@
   <p:sldIdLst>
     <p:sldId id="256" r:id="rId2"/>
     <p:sldId id="257" r:id="rId3"/>
+    <p:sldId id="258" r:id="rId4"/>
   </p:sldIdLst>
   <p:sldSz cx="12192000" cy="6858000"/>
   <p:notesSz cx="6858000" cy="9144000"/>
@@ -260,7 +261,7 @@
           <a:p>
             <a:fld id="{AD49FAB3-AFCC-4347-95D9-B5F6208C732B}" type="datetimeFigureOut">
               <a:rPr lang="en-US" smtClean="0"/>
-              <a:t>12/3/23</a:t>
+              <a:t>12/21/23</a:t>
             </a:fld>
             <a:endParaRPr lang="en-US"/>
           </a:p>
@@ -458,7 +459,7 @@
           <a:p>
             <a:fld id="{AD49FAB3-AFCC-4347-95D9-B5F6208C732B}" type="datetimeFigureOut">
               <a:rPr lang="en-US" smtClean="0"/>
-              <a:t>12/3/23</a:t>
+              <a:t>12/21/23</a:t>
             </a:fld>
             <a:endParaRPr lang="en-US"/>
           </a:p>
@@ -666,7 +667,7 @@
           <a:p>
             <a:fld id="{AD49FAB3-AFCC-4347-95D9-B5F6208C732B}" type="datetimeFigureOut">
               <a:rPr lang="en-US" smtClean="0"/>
-              <a:t>12/3/23</a:t>
+              <a:t>12/21/23</a:t>
             </a:fld>
             <a:endParaRPr lang="en-US"/>
           </a:p>
@@ -864,7 +865,7 @@
           <a:p>
             <a:fld id="{AD49FAB3-AFCC-4347-95D9-B5F6208C732B}" type="datetimeFigureOut">
               <a:rPr lang="en-US" smtClean="0"/>
-              <a:t>12/3/23</a:t>
+              <a:t>12/21/23</a:t>
             </a:fld>
             <a:endParaRPr lang="en-US"/>
           </a:p>
@@ -1139,7 +1140,7 @@
           <a:p>
             <a:fld id="{AD49FAB3-AFCC-4347-95D9-B5F6208C732B}" type="datetimeFigureOut">
               <a:rPr lang="en-US" smtClean="0"/>
-              <a:t>12/3/23</a:t>
+              <a:t>12/21/23</a:t>
             </a:fld>
             <a:endParaRPr lang="en-US"/>
           </a:p>
@@ -1404,7 +1405,7 @@
           <a:p>
             <a:fld id="{AD49FAB3-AFCC-4347-95D9-B5F6208C732B}" type="datetimeFigureOut">
               <a:rPr lang="en-US" smtClean="0"/>
-              <a:t>12/3/23</a:t>
+              <a:t>12/21/23</a:t>
             </a:fld>
             <a:endParaRPr lang="en-US"/>
           </a:p>
@@ -1816,7 +1817,7 @@
           <a:p>
             <a:fld id="{AD49FAB3-AFCC-4347-95D9-B5F6208C732B}" type="datetimeFigureOut">
               <a:rPr lang="en-US" smtClean="0"/>
-              <a:t>12/3/23</a:t>
+              <a:t>12/21/23</a:t>
             </a:fld>
             <a:endParaRPr lang="en-US"/>
           </a:p>
@@ -1957,7 +1958,7 @@
           <a:p>
             <a:fld id="{AD49FAB3-AFCC-4347-95D9-B5F6208C732B}" type="datetimeFigureOut">
               <a:rPr lang="en-US" smtClean="0"/>
-              <a:t>12/3/23</a:t>
+              <a:t>12/21/23</a:t>
             </a:fld>
             <a:endParaRPr lang="en-US"/>
           </a:p>
@@ -2070,7 +2071,7 @@
           <a:p>
             <a:fld id="{AD49FAB3-AFCC-4347-95D9-B5F6208C732B}" type="datetimeFigureOut">
               <a:rPr lang="en-US" smtClean="0"/>
-              <a:t>12/3/23</a:t>
+              <a:t>12/21/23</a:t>
             </a:fld>
             <a:endParaRPr lang="en-US"/>
           </a:p>
@@ -2381,7 +2382,7 @@
           <a:p>
             <a:fld id="{AD49FAB3-AFCC-4347-95D9-B5F6208C732B}" type="datetimeFigureOut">
               <a:rPr lang="en-US" smtClean="0"/>
-              <a:t>12/3/23</a:t>
+              <a:t>12/21/23</a:t>
             </a:fld>
             <a:endParaRPr lang="en-US"/>
           </a:p>
@@ -2669,7 +2670,7 @@
           <a:p>
             <a:fld id="{AD49FAB3-AFCC-4347-95D9-B5F6208C732B}" type="datetimeFigureOut">
               <a:rPr lang="en-US" smtClean="0"/>
-              <a:t>12/3/23</a:t>
+              <a:t>12/21/23</a:t>
             </a:fld>
             <a:endParaRPr lang="en-US"/>
           </a:p>
@@ -2910,7 +2911,7 @@
           <a:p>
             <a:fld id="{AD49FAB3-AFCC-4347-95D9-B5F6208C732B}" type="datetimeFigureOut">
               <a:rPr lang="en-US" smtClean="0"/>
-              <a:t>12/3/23</a:t>
+              <a:t>12/21/23</a:t>
             </a:fld>
             <a:endParaRPr lang="en-US"/>
           </a:p>
@@ -4370,6 +4371,91 @@
           </a:p>
         </p:txBody>
       </p:sp>
+      <p:cxnSp>
+        <p:nvCxnSpPr>
+          <p:cNvPr id="2" name="Straight Arrow Connector 1">
+            <a:extLst>
+              <a:ext uri="{FF2B5EF4-FFF2-40B4-BE49-F238E27FC236}">
+                <a16:creationId xmlns:a16="http://schemas.microsoft.com/office/drawing/2014/main" id="{37CE3A5B-058A-378C-D0C0-F25EBBE21441}"/>
+              </a:ext>
+            </a:extLst>
+          </p:cNvPr>
+          <p:cNvCxnSpPr>
+            <a:cxnSpLocks/>
+          </p:cNvCxnSpPr>
+          <p:nvPr/>
+        </p:nvCxnSpPr>
+        <p:spPr>
+          <a:xfrm>
+            <a:off x="3133569" y="1718240"/>
+            <a:ext cx="2027649" cy="736793"/>
+          </a:xfrm>
+          <a:prstGeom prst="straightConnector1">
+            <a:avLst/>
+          </a:prstGeom>
+          <a:ln w="25400">
+            <a:solidFill>
+              <a:srgbClr val="FF0000"/>
+            </a:solidFill>
+            <a:tailEnd type="oval" w="lg" len="lg"/>
+          </a:ln>
+        </p:spPr>
+        <p:style>
+          <a:lnRef idx="1">
+            <a:schemeClr val="accent1"/>
+          </a:lnRef>
+          <a:fillRef idx="0">
+            <a:schemeClr val="accent1"/>
+          </a:fillRef>
+          <a:effectRef idx="0">
+            <a:schemeClr val="accent1"/>
+          </a:effectRef>
+          <a:fontRef idx="minor">
+            <a:schemeClr val="tx1"/>
+          </a:fontRef>
+        </p:style>
+      </p:cxnSp>
+      <p:sp>
+        <p:nvSpPr>
+          <p:cNvPr id="8" name="TextBox 7">
+            <a:extLst>
+              <a:ext uri="{FF2B5EF4-FFF2-40B4-BE49-F238E27FC236}">
+                <a16:creationId xmlns:a16="http://schemas.microsoft.com/office/drawing/2014/main" id="{613AABCA-AAA4-E6FA-AA16-69C7235A0B95}"/>
+              </a:ext>
+            </a:extLst>
+          </p:cNvPr>
+          <p:cNvSpPr txBox="1"/>
+          <p:nvPr/>
+        </p:nvSpPr>
+        <p:spPr>
+          <a:xfrm>
+            <a:off x="1007873" y="1422560"/>
+            <a:ext cx="2427899" cy="369332"/>
+          </a:xfrm>
+          <a:prstGeom prst="rect">
+            <a:avLst/>
+          </a:prstGeom>
+          <a:noFill/>
+        </p:spPr>
+        <p:txBody>
+          <a:bodyPr wrap="square" rtlCol="0">
+            <a:spAutoFit/>
+          </a:bodyPr>
+          <a:lstStyle/>
+          <a:p>
+            <a:r>
+              <a:rPr lang="en-US" b="1" dirty="0">
+                <a:solidFill>
+                  <a:srgbClr val="FF0000"/>
+                </a:solidFill>
+                <a:latin typeface="Times New Roman" panose="02020603050405020304" pitchFamily="18" charset="0"/>
+                <a:cs typeface="Times New Roman" panose="02020603050405020304" pitchFamily="18" charset="0"/>
+              </a:rPr>
+              <a:t>Disable the controller</a:t>
+            </a:r>
+          </a:p>
+        </p:txBody>
+      </p:sp>
     </p:spTree>
     <p:extLst>
       <p:ext uri="{BB962C8B-B14F-4D97-AF65-F5344CB8AC3E}">
@@ -4705,6 +4791,408 @@
     <p:extLst>
       <p:ext uri="{BB962C8B-B14F-4D97-AF65-F5344CB8AC3E}">
         <p14:creationId xmlns:p14="http://schemas.microsoft.com/office/powerpoint/2010/main" val="3531266590"/>
+      </p:ext>
+    </p:extLst>
+  </p:cSld>
+  <p:clrMapOvr>
+    <a:masterClrMapping/>
+  </p:clrMapOvr>
+</p:sld>
+</file>
+
+<file path=ppt/slides/slide3.xml><?xml version="1.0" encoding="utf-8"?>
+<p:sld xmlns:a="http://schemas.openxmlformats.org/drawingml/2006/main" xmlns:r="http://schemas.openxmlformats.org/officeDocument/2006/relationships" xmlns:p="http://schemas.openxmlformats.org/presentationml/2006/main">
+  <p:cSld>
+    <p:spTree>
+      <p:nvGrpSpPr>
+        <p:cNvPr id="1" name=""/>
+        <p:cNvGrpSpPr/>
+        <p:nvPr/>
+      </p:nvGrpSpPr>
+      <p:grpSpPr>
+        <a:xfrm>
+          <a:off x="0" y="0"/>
+          <a:ext cx="0" cy="0"/>
+          <a:chOff x="0" y="0"/>
+          <a:chExt cx="0" cy="0"/>
+        </a:xfrm>
+      </p:grpSpPr>
+      <p:sp>
+        <p:nvSpPr>
+          <p:cNvPr id="4" name="Rectangle 3">
+            <a:extLst>
+              <a:ext uri="{FF2B5EF4-FFF2-40B4-BE49-F238E27FC236}">
+                <a16:creationId xmlns:a16="http://schemas.microsoft.com/office/drawing/2014/main" id="{326A3711-C545-D348-B642-CC0BDFED6E14}"/>
+              </a:ext>
+            </a:extLst>
+          </p:cNvPr>
+          <p:cNvSpPr/>
+          <p:nvPr/>
+        </p:nvSpPr>
+        <p:spPr>
+          <a:xfrm>
+            <a:off x="1757548" y="1223158"/>
+            <a:ext cx="5391397" cy="1531917"/>
+          </a:xfrm>
+          <a:prstGeom prst="rect">
+            <a:avLst/>
+          </a:prstGeom>
+        </p:spPr>
+        <p:style>
+          <a:lnRef idx="2">
+            <a:schemeClr val="accent1">
+              <a:shade val="15000"/>
+            </a:schemeClr>
+          </a:lnRef>
+          <a:fillRef idx="1">
+            <a:schemeClr val="accent1"/>
+          </a:fillRef>
+          <a:effectRef idx="0">
+            <a:schemeClr val="accent1"/>
+          </a:effectRef>
+          <a:fontRef idx="minor">
+            <a:schemeClr val="lt1"/>
+          </a:fontRef>
+        </p:style>
+        <p:txBody>
+          <a:bodyPr rtlCol="0" anchor="ctr"/>
+          <a:lstStyle/>
+          <a:p>
+            <a:pPr algn="ctr"/>
+            <a:endParaRPr lang="en-US"/>
+          </a:p>
+        </p:txBody>
+      </p:sp>
+      <p:cxnSp>
+        <p:nvCxnSpPr>
+          <p:cNvPr id="7" name="Straight Arrow Connector 6">
+            <a:extLst>
+              <a:ext uri="{FF2B5EF4-FFF2-40B4-BE49-F238E27FC236}">
+                <a16:creationId xmlns:a16="http://schemas.microsoft.com/office/drawing/2014/main" id="{708F3322-0D62-7991-0DC6-604D00866FA9}"/>
+              </a:ext>
+            </a:extLst>
+          </p:cNvPr>
+          <p:cNvCxnSpPr/>
+          <p:nvPr/>
+        </p:nvCxnSpPr>
+        <p:spPr>
+          <a:xfrm>
+            <a:off x="3210233" y="1046277"/>
+            <a:ext cx="2171700" cy="0"/>
+          </a:xfrm>
+          <a:prstGeom prst="straightConnector1">
+            <a:avLst/>
+          </a:prstGeom>
+          <a:ln w="25400">
+            <a:solidFill>
+              <a:schemeClr val="tx1"/>
+            </a:solidFill>
+            <a:tailEnd type="triangle" w="lg" len="lg"/>
+          </a:ln>
+        </p:spPr>
+        <p:style>
+          <a:lnRef idx="1">
+            <a:schemeClr val="accent1"/>
+          </a:lnRef>
+          <a:fillRef idx="0">
+            <a:schemeClr val="accent1"/>
+          </a:fillRef>
+          <a:effectRef idx="0">
+            <a:schemeClr val="accent1"/>
+          </a:effectRef>
+          <a:fontRef idx="minor">
+            <a:schemeClr val="tx1"/>
+          </a:fontRef>
+        </p:style>
+      </p:cxnSp>
+      <p:sp>
+        <p:nvSpPr>
+          <p:cNvPr id="8" name="TextBox 7">
+            <a:extLst>
+              <a:ext uri="{FF2B5EF4-FFF2-40B4-BE49-F238E27FC236}">
+                <a16:creationId xmlns:a16="http://schemas.microsoft.com/office/drawing/2014/main" id="{AA373814-EDDD-BB80-D276-2C0BFE38C8E9}"/>
+              </a:ext>
+            </a:extLst>
+          </p:cNvPr>
+          <p:cNvSpPr txBox="1"/>
+          <p:nvPr/>
+        </p:nvSpPr>
+        <p:spPr>
+          <a:xfrm>
+            <a:off x="3524558" y="662657"/>
+            <a:ext cx="1857375" cy="369332"/>
+          </a:xfrm>
+          <a:prstGeom prst="rect">
+            <a:avLst/>
+          </a:prstGeom>
+          <a:noFill/>
+        </p:spPr>
+        <p:txBody>
+          <a:bodyPr wrap="square" rtlCol="0">
+            <a:spAutoFit/>
+          </a:bodyPr>
+          <a:lstStyle/>
+          <a:p>
+            <a:r>
+              <a:rPr lang="en-US" dirty="0">
+                <a:latin typeface="Times New Roman" panose="02020603050405020304" pitchFamily="18" charset="0"/>
+                <a:cs typeface="Times New Roman" panose="02020603050405020304" pitchFamily="18" charset="0"/>
+              </a:rPr>
+              <a:t>Forward</a:t>
+            </a:r>
+          </a:p>
+        </p:txBody>
+      </p:sp>
+      <p:cxnSp>
+        <p:nvCxnSpPr>
+          <p:cNvPr id="9" name="Straight Arrow Connector 8">
+            <a:extLst>
+              <a:ext uri="{FF2B5EF4-FFF2-40B4-BE49-F238E27FC236}">
+                <a16:creationId xmlns:a16="http://schemas.microsoft.com/office/drawing/2014/main" id="{6B22804D-D2D7-246B-F7EA-D5B9997F50CA}"/>
+              </a:ext>
+            </a:extLst>
+          </p:cNvPr>
+          <p:cNvCxnSpPr>
+            <a:cxnSpLocks/>
+          </p:cNvCxnSpPr>
+          <p:nvPr/>
+        </p:nvCxnSpPr>
+        <p:spPr>
+          <a:xfrm flipV="1">
+            <a:off x="2405371" y="662657"/>
+            <a:ext cx="0" cy="1198677"/>
+          </a:xfrm>
+          <a:prstGeom prst="straightConnector1">
+            <a:avLst/>
+          </a:prstGeom>
+          <a:ln w="25400">
+            <a:solidFill>
+              <a:schemeClr val="tx1"/>
+            </a:solidFill>
+            <a:tailEnd type="triangle" w="lg" len="lg"/>
+          </a:ln>
+        </p:spPr>
+        <p:style>
+          <a:lnRef idx="1">
+            <a:schemeClr val="accent1"/>
+          </a:lnRef>
+          <a:fillRef idx="0">
+            <a:schemeClr val="accent1"/>
+          </a:fillRef>
+          <a:effectRef idx="0">
+            <a:schemeClr val="accent1"/>
+          </a:effectRef>
+          <a:fontRef idx="minor">
+            <a:schemeClr val="tx1"/>
+          </a:fontRef>
+        </p:style>
+      </p:cxnSp>
+      <p:cxnSp>
+        <p:nvCxnSpPr>
+          <p:cNvPr id="11" name="Straight Arrow Connector 10">
+            <a:extLst>
+              <a:ext uri="{FF2B5EF4-FFF2-40B4-BE49-F238E27FC236}">
+                <a16:creationId xmlns:a16="http://schemas.microsoft.com/office/drawing/2014/main" id="{BE5E4F50-CB07-479A-4E20-B2985711CD76}"/>
+              </a:ext>
+            </a:extLst>
+          </p:cNvPr>
+          <p:cNvCxnSpPr>
+            <a:cxnSpLocks/>
+          </p:cNvCxnSpPr>
+          <p:nvPr/>
+        </p:nvCxnSpPr>
+        <p:spPr>
+          <a:xfrm flipV="1">
+            <a:off x="6372533" y="732621"/>
+            <a:ext cx="0" cy="1198677"/>
+          </a:xfrm>
+          <a:prstGeom prst="straightConnector1">
+            <a:avLst/>
+          </a:prstGeom>
+          <a:ln w="25400">
+            <a:solidFill>
+              <a:schemeClr val="tx1"/>
+            </a:solidFill>
+            <a:tailEnd type="triangle" w="lg" len="lg"/>
+          </a:ln>
+        </p:spPr>
+        <p:style>
+          <a:lnRef idx="1">
+            <a:schemeClr val="accent1"/>
+          </a:lnRef>
+          <a:fillRef idx="0">
+            <a:schemeClr val="accent1"/>
+          </a:fillRef>
+          <a:effectRef idx="0">
+            <a:schemeClr val="accent1"/>
+          </a:effectRef>
+          <a:fontRef idx="minor">
+            <a:schemeClr val="tx1"/>
+          </a:fontRef>
+        </p:style>
+      </p:cxnSp>
+      <p:sp>
+        <p:nvSpPr>
+          <p:cNvPr id="12" name="TextBox 11">
+            <a:extLst>
+              <a:ext uri="{FF2B5EF4-FFF2-40B4-BE49-F238E27FC236}">
+                <a16:creationId xmlns:a16="http://schemas.microsoft.com/office/drawing/2014/main" id="{B4B7FE70-3A09-DBF0-5A61-85D0C739F0D7}"/>
+              </a:ext>
+            </a:extLst>
+          </p:cNvPr>
+          <p:cNvSpPr txBox="1"/>
+          <p:nvPr/>
+        </p:nvSpPr>
+        <p:spPr>
+          <a:xfrm>
+            <a:off x="2176771" y="303186"/>
+            <a:ext cx="1857375" cy="369332"/>
+          </a:xfrm>
+          <a:prstGeom prst="rect">
+            <a:avLst/>
+          </a:prstGeom>
+          <a:noFill/>
+        </p:spPr>
+        <p:txBody>
+          <a:bodyPr wrap="square" rtlCol="0">
+            <a:spAutoFit/>
+          </a:bodyPr>
+          <a:lstStyle/>
+          <a:p>
+            <a:r>
+              <a:rPr lang="en-US" dirty="0">
+                <a:latin typeface="Times New Roman" panose="02020603050405020304" pitchFamily="18" charset="0"/>
+                <a:cs typeface="Times New Roman" panose="02020603050405020304" pitchFamily="18" charset="0"/>
+              </a:rPr>
+              <a:t>HS</a:t>
+            </a:r>
+          </a:p>
+        </p:txBody>
+      </p:sp>
+      <p:sp>
+        <p:nvSpPr>
+          <p:cNvPr id="13" name="TextBox 12">
+            <a:extLst>
+              <a:ext uri="{FF2B5EF4-FFF2-40B4-BE49-F238E27FC236}">
+                <a16:creationId xmlns:a16="http://schemas.microsoft.com/office/drawing/2014/main" id="{1E407DC3-2521-3355-0739-9DCB6123D4FF}"/>
+              </a:ext>
+            </a:extLst>
+          </p:cNvPr>
+          <p:cNvSpPr txBox="1"/>
+          <p:nvPr/>
+        </p:nvSpPr>
+        <p:spPr>
+          <a:xfrm>
+            <a:off x="6096000" y="363289"/>
+            <a:ext cx="1857375" cy="369332"/>
+          </a:xfrm>
+          <a:prstGeom prst="rect">
+            <a:avLst/>
+          </a:prstGeom>
+          <a:noFill/>
+        </p:spPr>
+        <p:txBody>
+          <a:bodyPr wrap="square" rtlCol="0">
+            <a:spAutoFit/>
+          </a:bodyPr>
+          <a:lstStyle/>
+          <a:p>
+            <a:r>
+              <a:rPr lang="en-US" dirty="0">
+                <a:latin typeface="Times New Roman" panose="02020603050405020304" pitchFamily="18" charset="0"/>
+                <a:cs typeface="Times New Roman" panose="02020603050405020304" pitchFamily="18" charset="0"/>
+              </a:rPr>
+              <a:t>HB</a:t>
+            </a:r>
+          </a:p>
+        </p:txBody>
+      </p:sp>
+      <p:cxnSp>
+        <p:nvCxnSpPr>
+          <p:cNvPr id="14" name="Straight Arrow Connector 13">
+            <a:extLst>
+              <a:ext uri="{FF2B5EF4-FFF2-40B4-BE49-F238E27FC236}">
+                <a16:creationId xmlns:a16="http://schemas.microsoft.com/office/drawing/2014/main" id="{CA91D6C1-F7C8-5370-F93A-29F34F5DF25D}"/>
+              </a:ext>
+            </a:extLst>
+          </p:cNvPr>
+          <p:cNvCxnSpPr>
+            <a:cxnSpLocks/>
+          </p:cNvCxnSpPr>
+          <p:nvPr/>
+        </p:nvCxnSpPr>
+        <p:spPr>
+          <a:xfrm>
+            <a:off x="1662729" y="2113746"/>
+            <a:ext cx="1256992" cy="0"/>
+          </a:xfrm>
+          <a:prstGeom prst="straightConnector1">
+            <a:avLst/>
+          </a:prstGeom>
+          <a:ln w="25400">
+            <a:solidFill>
+              <a:schemeClr val="tx1"/>
+            </a:solidFill>
+            <a:tailEnd type="triangle" w="lg" len="lg"/>
+          </a:ln>
+        </p:spPr>
+        <p:style>
+          <a:lnRef idx="1">
+            <a:schemeClr val="accent1"/>
+          </a:lnRef>
+          <a:fillRef idx="0">
+            <a:schemeClr val="accent1"/>
+          </a:fillRef>
+          <a:effectRef idx="0">
+            <a:schemeClr val="accent1"/>
+          </a:effectRef>
+          <a:fontRef idx="minor">
+            <a:schemeClr val="tx1"/>
+          </a:fontRef>
+        </p:style>
+      </p:cxnSp>
+      <p:sp>
+        <p:nvSpPr>
+          <p:cNvPr id="16" name="TextBox 15">
+            <a:extLst>
+              <a:ext uri="{FF2B5EF4-FFF2-40B4-BE49-F238E27FC236}">
+                <a16:creationId xmlns:a16="http://schemas.microsoft.com/office/drawing/2014/main" id="{B38E57FD-AB6D-33B2-2300-70CDF00DF632}"/>
+              </a:ext>
+            </a:extLst>
+          </p:cNvPr>
+          <p:cNvSpPr txBox="1"/>
+          <p:nvPr/>
+        </p:nvSpPr>
+        <p:spPr>
+          <a:xfrm>
+            <a:off x="2701263" y="1655974"/>
+            <a:ext cx="1857375" cy="369332"/>
+          </a:xfrm>
+          <a:prstGeom prst="rect">
+            <a:avLst/>
+          </a:prstGeom>
+          <a:noFill/>
+        </p:spPr>
+        <p:txBody>
+          <a:bodyPr wrap="square" rtlCol="0">
+            <a:spAutoFit/>
+          </a:bodyPr>
+          <a:lstStyle/>
+          <a:p>
+            <a:r>
+              <a:rPr lang="en-US" dirty="0">
+                <a:latin typeface="Times New Roman" panose="02020603050405020304" pitchFamily="18" charset="0"/>
+                <a:cs typeface="Times New Roman" panose="02020603050405020304" pitchFamily="18" charset="0"/>
+              </a:rPr>
+              <a:t>Surge</a:t>
+            </a:r>
+          </a:p>
+        </p:txBody>
+      </p:sp>
+    </p:spTree>
+    <p:extLst>
+      <p:ext uri="{BB962C8B-B14F-4D97-AF65-F5344CB8AC3E}">
+        <p14:creationId xmlns:p14="http://schemas.microsoft.com/office/powerpoint/2010/main" val="886614228"/>
       </p:ext>
     </p:extLst>
   </p:cSld>

</xml_diff>

<commit_message>
updated the teleop picture
</commit_message>
<xml_diff>
--- a/pictures/pic.pptx
+++ b/pictures/pic.pptx
@@ -261,7 +261,7 @@
           <a:p>
             <a:fld id="{AD49FAB3-AFCC-4347-95D9-B5F6208C732B}" type="datetimeFigureOut">
               <a:rPr lang="en-US" smtClean="0"/>
-              <a:t>3/6/24</a:t>
+              <a:t>5/20/24</a:t>
             </a:fld>
             <a:endParaRPr lang="en-US"/>
           </a:p>
@@ -459,7 +459,7 @@
           <a:p>
             <a:fld id="{AD49FAB3-AFCC-4347-95D9-B5F6208C732B}" type="datetimeFigureOut">
               <a:rPr lang="en-US" smtClean="0"/>
-              <a:t>3/6/24</a:t>
+              <a:t>5/20/24</a:t>
             </a:fld>
             <a:endParaRPr lang="en-US"/>
           </a:p>
@@ -667,7 +667,7 @@
           <a:p>
             <a:fld id="{AD49FAB3-AFCC-4347-95D9-B5F6208C732B}" type="datetimeFigureOut">
               <a:rPr lang="en-US" smtClean="0"/>
-              <a:t>3/6/24</a:t>
+              <a:t>5/20/24</a:t>
             </a:fld>
             <a:endParaRPr lang="en-US"/>
           </a:p>
@@ -865,7 +865,7 @@
           <a:p>
             <a:fld id="{AD49FAB3-AFCC-4347-95D9-B5F6208C732B}" type="datetimeFigureOut">
               <a:rPr lang="en-US" smtClean="0"/>
-              <a:t>3/6/24</a:t>
+              <a:t>5/20/24</a:t>
             </a:fld>
             <a:endParaRPr lang="en-US"/>
           </a:p>
@@ -1140,7 +1140,7 @@
           <a:p>
             <a:fld id="{AD49FAB3-AFCC-4347-95D9-B5F6208C732B}" type="datetimeFigureOut">
               <a:rPr lang="en-US" smtClean="0"/>
-              <a:t>3/6/24</a:t>
+              <a:t>5/20/24</a:t>
             </a:fld>
             <a:endParaRPr lang="en-US"/>
           </a:p>
@@ -1405,7 +1405,7 @@
           <a:p>
             <a:fld id="{AD49FAB3-AFCC-4347-95D9-B5F6208C732B}" type="datetimeFigureOut">
               <a:rPr lang="en-US" smtClean="0"/>
-              <a:t>3/6/24</a:t>
+              <a:t>5/20/24</a:t>
             </a:fld>
             <a:endParaRPr lang="en-US"/>
           </a:p>
@@ -1817,7 +1817,7 @@
           <a:p>
             <a:fld id="{AD49FAB3-AFCC-4347-95D9-B5F6208C732B}" type="datetimeFigureOut">
               <a:rPr lang="en-US" smtClean="0"/>
-              <a:t>3/6/24</a:t>
+              <a:t>5/20/24</a:t>
             </a:fld>
             <a:endParaRPr lang="en-US"/>
           </a:p>
@@ -1958,7 +1958,7 @@
           <a:p>
             <a:fld id="{AD49FAB3-AFCC-4347-95D9-B5F6208C732B}" type="datetimeFigureOut">
               <a:rPr lang="en-US" smtClean="0"/>
-              <a:t>3/6/24</a:t>
+              <a:t>5/20/24</a:t>
             </a:fld>
             <a:endParaRPr lang="en-US"/>
           </a:p>
@@ -2071,7 +2071,7 @@
           <a:p>
             <a:fld id="{AD49FAB3-AFCC-4347-95D9-B5F6208C732B}" type="datetimeFigureOut">
               <a:rPr lang="en-US" smtClean="0"/>
-              <a:t>3/6/24</a:t>
+              <a:t>5/20/24</a:t>
             </a:fld>
             <a:endParaRPr lang="en-US"/>
           </a:p>
@@ -2382,7 +2382,7 @@
           <a:p>
             <a:fld id="{AD49FAB3-AFCC-4347-95D9-B5F6208C732B}" type="datetimeFigureOut">
               <a:rPr lang="en-US" smtClean="0"/>
-              <a:t>3/6/24</a:t>
+              <a:t>5/20/24</a:t>
             </a:fld>
             <a:endParaRPr lang="en-US"/>
           </a:p>
@@ -2670,7 +2670,7 @@
           <a:p>
             <a:fld id="{AD49FAB3-AFCC-4347-95D9-B5F6208C732B}" type="datetimeFigureOut">
               <a:rPr lang="en-US" smtClean="0"/>
-              <a:t>3/6/24</a:t>
+              <a:t>5/20/24</a:t>
             </a:fld>
             <a:endParaRPr lang="en-US"/>
           </a:p>
@@ -2911,7 +2911,7 @@
           <a:p>
             <a:fld id="{AD49FAB3-AFCC-4347-95D9-B5F6208C732B}" type="datetimeFigureOut">
               <a:rPr lang="en-US" smtClean="0"/>
-              <a:t>3/6/24</a:t>
+              <a:t>5/20/24</a:t>
             </a:fld>
             <a:endParaRPr lang="en-US"/>
           </a:p>
@@ -3372,8 +3372,8 @@
         </p:nvSpPr>
         <p:spPr>
           <a:xfrm>
-            <a:off x="1286988" y="354498"/>
-            <a:ext cx="3653890" cy="646331"/>
+            <a:off x="1020625" y="22360"/>
+            <a:ext cx="3653890" cy="923330"/>
           </a:xfrm>
           <a:prstGeom prst="rect">
             <a:avLst/>
@@ -3403,7 +3403,27 @@
                 <a:latin typeface="Times New Roman" panose="02020603050405020304" pitchFamily="18" charset="0"/>
                 <a:cs typeface="Times New Roman" panose="02020603050405020304" pitchFamily="18" charset="0"/>
               </a:rPr>
-              <a:t>LT: Press to disable/enable </a:t>
+              <a:t>LT: Press to </a:t>
+            </a:r>
+            <a:r>
+              <a:rPr lang="en-US" b="1" dirty="0">
+                <a:solidFill>
+                  <a:srgbClr val="FF0000"/>
+                </a:solidFill>
+                <a:latin typeface="Times New Roman" panose="02020603050405020304" pitchFamily="18" charset="0"/>
+                <a:cs typeface="Times New Roman" panose="02020603050405020304" pitchFamily="18" charset="0"/>
+              </a:rPr>
+              <a:t>Enable</a:t>
+            </a:r>
+            <a:r>
+              <a:rPr lang="en-US" dirty="0">
+                <a:solidFill>
+                  <a:srgbClr val="FF0000"/>
+                </a:solidFill>
+                <a:latin typeface="Times New Roman" panose="02020603050405020304" pitchFamily="18" charset="0"/>
+                <a:cs typeface="Times New Roman" panose="02020603050405020304" pitchFamily="18" charset="0"/>
+              </a:rPr>
+              <a:t> </a:t>
             </a:r>
             <a:r>
               <a:rPr lang="en-US" dirty="0" err="1">
@@ -3415,13 +3435,16 @@
               </a:rPr>
               <a:t>teleop</a:t>
             </a:r>
-            <a:endParaRPr lang="en-US" dirty="0">
-              <a:solidFill>
-                <a:srgbClr val="FF0000"/>
-              </a:solidFill>
-              <a:latin typeface="Times New Roman" panose="02020603050405020304" pitchFamily="18" charset="0"/>
-              <a:cs typeface="Times New Roman" panose="02020603050405020304" pitchFamily="18" charset="0"/>
-            </a:endParaRPr>
+            <a:r>
+              <a:rPr lang="en-US" dirty="0">
+                <a:solidFill>
+                  <a:srgbClr val="FF0000"/>
+                </a:solidFill>
+                <a:latin typeface="Times New Roman" panose="02020603050405020304" pitchFamily="18" charset="0"/>
+                <a:cs typeface="Times New Roman" panose="02020603050405020304" pitchFamily="18" charset="0"/>
+              </a:rPr>
+              <a:t> (current pose will be the initial set point)</a:t>
+            </a:r>
           </a:p>
         </p:txBody>
       </p:sp>
@@ -3499,10 +3522,18 @@
                 <a:latin typeface="Times New Roman" panose="02020603050405020304" pitchFamily="18" charset="0"/>
                 <a:cs typeface="Times New Roman" panose="02020603050405020304" pitchFamily="18" charset="0"/>
               </a:rPr>
-              <a:t>RB: decrease desired depth (going up in NED)</a:t>
-            </a:r>
-          </a:p>
-          <a:p>
+              <a:t>RB: </a:t>
+            </a:r>
+            <a:r>
+              <a:rPr lang="en-US" b="1" dirty="0">
+                <a:solidFill>
+                  <a:srgbClr val="00B0F0"/>
+                </a:solidFill>
+                <a:latin typeface="Times New Roman" panose="02020603050405020304" pitchFamily="18" charset="0"/>
+                <a:cs typeface="Times New Roman" panose="02020603050405020304" pitchFamily="18" charset="0"/>
+              </a:rPr>
+              <a:t>decrease</a:t>
+            </a:r>
             <a:r>
               <a:rPr lang="en-US" dirty="0">
                 <a:solidFill>
@@ -3511,7 +3542,39 @@
                 <a:latin typeface="Times New Roman" panose="02020603050405020304" pitchFamily="18" charset="0"/>
                 <a:cs typeface="Times New Roman" panose="02020603050405020304" pitchFamily="18" charset="0"/>
               </a:rPr>
-              <a:t>RT: increase depth increase (going down in NED)</a:t>
+              <a:t> desired depth (going up in NED)</a:t>
+            </a:r>
+          </a:p>
+          <a:p>
+            <a:r>
+              <a:rPr lang="en-US" dirty="0">
+                <a:solidFill>
+                  <a:srgbClr val="00B0F0"/>
+                </a:solidFill>
+                <a:latin typeface="Times New Roman" panose="02020603050405020304" pitchFamily="18" charset="0"/>
+                <a:cs typeface="Times New Roman" panose="02020603050405020304" pitchFamily="18" charset="0"/>
+              </a:rPr>
+              <a:t>RT: </a:t>
+            </a:r>
+            <a:r>
+              <a:rPr lang="en-US" b="1" dirty="0">
+                <a:solidFill>
+                  <a:srgbClr val="00B0F0"/>
+                </a:solidFill>
+                <a:latin typeface="Times New Roman" panose="02020603050405020304" pitchFamily="18" charset="0"/>
+                <a:cs typeface="Times New Roman" panose="02020603050405020304" pitchFamily="18" charset="0"/>
+              </a:rPr>
+              <a:t>increase</a:t>
+            </a:r>
+            <a:r>
+              <a:rPr lang="en-US" dirty="0">
+                <a:solidFill>
+                  <a:srgbClr val="00B0F0"/>
+                </a:solidFill>
+                <a:latin typeface="Times New Roman" panose="02020603050405020304" pitchFamily="18" charset="0"/>
+                <a:cs typeface="Times New Roman" panose="02020603050405020304" pitchFamily="18" charset="0"/>
+              </a:rPr>
+              <a:t> depth increase (going down in NED)</a:t>
             </a:r>
           </a:p>
         </p:txBody>
@@ -3596,39 +3659,18 @@
                 <a:latin typeface="Times New Roman" panose="02020603050405020304" pitchFamily="18" charset="0"/>
                 <a:cs typeface="Times New Roman" panose="02020603050405020304" pitchFamily="18" charset="0"/>
               </a:rPr>
-              <a:t>Y: decrease pitch (nose down in NED)</a:t>
-            </a:r>
-          </a:p>
-        </p:txBody>
-      </p:sp>
-      <p:sp>
-        <p:nvSpPr>
-          <p:cNvPr id="18" name="TextBox 17">
-            <a:extLst>
-              <a:ext uri="{FF2B5EF4-FFF2-40B4-BE49-F238E27FC236}">
-                <a16:creationId xmlns:a16="http://schemas.microsoft.com/office/drawing/2014/main" id="{7405237B-94F0-80A0-9F52-C946386117DA}"/>
-              </a:ext>
-            </a:extLst>
-          </p:cNvPr>
-          <p:cNvSpPr txBox="1"/>
-          <p:nvPr/>
-        </p:nvSpPr>
-        <p:spPr>
-          <a:xfrm>
-            <a:off x="8273548" y="2887949"/>
-            <a:ext cx="3779322" cy="369332"/>
-          </a:xfrm>
-          <a:prstGeom prst="rect">
-            <a:avLst/>
-          </a:prstGeom>
-          <a:noFill/>
-        </p:spPr>
-        <p:txBody>
-          <a:bodyPr wrap="square">
-            <a:spAutoFit/>
-          </a:bodyPr>
-          <a:lstStyle/>
-          <a:p>
+              <a:t>Y: </a:t>
+            </a:r>
+            <a:r>
+              <a:rPr lang="en-US" b="1" dirty="0">
+                <a:solidFill>
+                  <a:srgbClr val="FF0000"/>
+                </a:solidFill>
+                <a:latin typeface="Times New Roman" panose="02020603050405020304" pitchFamily="18" charset="0"/>
+                <a:cs typeface="Times New Roman" panose="02020603050405020304" pitchFamily="18" charset="0"/>
+              </a:rPr>
+              <a:t>decrease</a:t>
+            </a:r>
             <a:r>
               <a:rPr lang="en-US" dirty="0">
                 <a:solidFill>
@@ -3637,7 +3679,68 @@
                 <a:latin typeface="Times New Roman" panose="02020603050405020304" pitchFamily="18" charset="0"/>
                 <a:cs typeface="Times New Roman" panose="02020603050405020304" pitchFamily="18" charset="0"/>
               </a:rPr>
-              <a:t>A: increase pitch (nose up in NED)</a:t>
+              <a:t> pitch (nose down in NED)</a:t>
+            </a:r>
+          </a:p>
+        </p:txBody>
+      </p:sp>
+      <p:sp>
+        <p:nvSpPr>
+          <p:cNvPr id="18" name="TextBox 17">
+            <a:extLst>
+              <a:ext uri="{FF2B5EF4-FFF2-40B4-BE49-F238E27FC236}">
+                <a16:creationId xmlns:a16="http://schemas.microsoft.com/office/drawing/2014/main" id="{7405237B-94F0-80A0-9F52-C946386117DA}"/>
+              </a:ext>
+            </a:extLst>
+          </p:cNvPr>
+          <p:cNvSpPr txBox="1"/>
+          <p:nvPr/>
+        </p:nvSpPr>
+        <p:spPr>
+          <a:xfrm>
+            <a:off x="8273548" y="2887949"/>
+            <a:ext cx="3779322" cy="369332"/>
+          </a:xfrm>
+          <a:prstGeom prst="rect">
+            <a:avLst/>
+          </a:prstGeom>
+          <a:noFill/>
+        </p:spPr>
+        <p:txBody>
+          <a:bodyPr wrap="square">
+            <a:spAutoFit/>
+          </a:bodyPr>
+          <a:lstStyle/>
+          <a:p>
+            <a:r>
+              <a:rPr lang="en-US" dirty="0">
+                <a:solidFill>
+                  <a:srgbClr val="FF0000"/>
+                </a:solidFill>
+                <a:latin typeface="Times New Roman" panose="02020603050405020304" pitchFamily="18" charset="0"/>
+                <a:cs typeface="Times New Roman" panose="02020603050405020304" pitchFamily="18" charset="0"/>
+              </a:rPr>
+              <a:t>A: </a:t>
+            </a:r>
+            <a:r>
+              <a:rPr lang="en-US" b="1" dirty="0">
+                <a:solidFill>
+                  <a:srgbClr val="FF0000"/>
+                </a:solidFill>
+                <a:latin typeface="Times New Roman" panose="02020603050405020304" pitchFamily="18" charset="0"/>
+                <a:cs typeface="Times New Roman" panose="02020603050405020304" pitchFamily="18" charset="0"/>
+              </a:rPr>
+              <a:t>increase</a:t>
+            </a:r>
+            <a:r>
+              <a:rPr lang="en-US" dirty="0">
+                <a:solidFill>
+                  <a:srgbClr val="FF0000"/>
+                </a:solidFill>
+                <a:latin typeface="Times New Roman" panose="02020603050405020304" pitchFamily="18" charset="0"/>
+                <a:cs typeface="Times New Roman" panose="02020603050405020304" pitchFamily="18" charset="0"/>
+              </a:rPr>
+              <a:t> pitch (nose up in NED)</a:t>
             </a:r>
           </a:p>
         </p:txBody>
@@ -3766,7 +3869,27 @@
                 <a:latin typeface="Times New Roman" panose="02020603050405020304" pitchFamily="18" charset="0"/>
                 <a:cs typeface="Times New Roman" panose="02020603050405020304" pitchFamily="18" charset="0"/>
               </a:rPr>
-              <a:t>B: increase yaw (turn to starboard)</a:t>
+              <a:t>B: </a:t>
+            </a:r>
+            <a:r>
+              <a:rPr lang="en-US" b="1" dirty="0">
+                <a:solidFill>
+                  <a:srgbClr val="00B050"/>
+                </a:solidFill>
+                <a:latin typeface="Times New Roman" panose="02020603050405020304" pitchFamily="18" charset="0"/>
+                <a:cs typeface="Times New Roman" panose="02020603050405020304" pitchFamily="18" charset="0"/>
+              </a:rPr>
+              <a:t>increase</a:t>
+            </a:r>
+            <a:r>
+              <a:rPr lang="en-US" dirty="0">
+                <a:solidFill>
+                  <a:srgbClr val="00B050"/>
+                </a:solidFill>
+                <a:latin typeface="Times New Roman" panose="02020603050405020304" pitchFamily="18" charset="0"/>
+                <a:cs typeface="Times New Roman" panose="02020603050405020304" pitchFamily="18" charset="0"/>
+              </a:rPr>
+              <a:t> yaw (turn to starboard)</a:t>
             </a:r>
           </a:p>
         </p:txBody>
@@ -4031,7 +4154,27 @@
                 <a:latin typeface="Times New Roman" panose="02020603050405020304" pitchFamily="18" charset="0"/>
                 <a:cs typeface="Times New Roman" panose="02020603050405020304" pitchFamily="18" charset="0"/>
               </a:rPr>
-              <a:t>X: decrease yaw (turn to port)</a:t>
+              <a:t>X: </a:t>
+            </a:r>
+            <a:r>
+              <a:rPr lang="en-US" b="1" dirty="0">
+                <a:solidFill>
+                  <a:srgbClr val="00B050"/>
+                </a:solidFill>
+                <a:latin typeface="Times New Roman" panose="02020603050405020304" pitchFamily="18" charset="0"/>
+                <a:cs typeface="Times New Roman" panose="02020603050405020304" pitchFamily="18" charset="0"/>
+              </a:rPr>
+              <a:t>decrease</a:t>
+            </a:r>
+            <a:r>
+              <a:rPr lang="en-US" dirty="0">
+                <a:solidFill>
+                  <a:srgbClr val="00B050"/>
+                </a:solidFill>
+                <a:latin typeface="Times New Roman" panose="02020603050405020304" pitchFamily="18" charset="0"/>
+                <a:cs typeface="Times New Roman" panose="02020603050405020304" pitchFamily="18" charset="0"/>
+              </a:rPr>
+              <a:t> yaw (turn to port)</a:t>
             </a:r>
           </a:p>
         </p:txBody>
@@ -4471,7 +4614,17 @@
                 <a:latin typeface="Times New Roman" panose="02020603050405020304" pitchFamily="18" charset="0"/>
                 <a:cs typeface="Times New Roman" panose="02020603050405020304" pitchFamily="18" charset="0"/>
               </a:rPr>
-              <a:t>Disable the controller</a:t>
+              <a:t>Disable</a:t>
+            </a:r>
+            <a:r>
+              <a:rPr lang="en-US" dirty="0">
+                <a:solidFill>
+                  <a:srgbClr val="FF0000"/>
+                </a:solidFill>
+                <a:latin typeface="Times New Roman" panose="02020603050405020304" pitchFamily="18" charset="0"/>
+                <a:cs typeface="Times New Roman" panose="02020603050405020304" pitchFamily="18" charset="0"/>
+              </a:rPr>
+              <a:t> the controller</a:t>
             </a:r>
           </a:p>
           <a:p>
@@ -4483,27 +4636,17 @@
                 <a:latin typeface="Times New Roman" panose="02020603050405020304" pitchFamily="18" charset="0"/>
                 <a:cs typeface="Times New Roman" panose="02020603050405020304" pitchFamily="18" charset="0"/>
               </a:rPr>
-              <a:t>Set </a:t>
-            </a:r>
-            <a:r>
-              <a:rPr lang="en-US" b="1" dirty="0" err="1">
+              <a:t>Disable</a:t>
+            </a:r>
+            <a:r>
+              <a:rPr lang="en-US" dirty="0">
                 <a:solidFill>
                   <a:srgbClr val="FF0000"/>
                 </a:solidFill>
                 <a:latin typeface="Times New Roman" panose="02020603050405020304" pitchFamily="18" charset="0"/>
                 <a:cs typeface="Times New Roman" panose="02020603050405020304" pitchFamily="18" charset="0"/>
               </a:rPr>
-              <a:t>Teleop</a:t>
-            </a:r>
-            <a:r>
-              <a:rPr lang="en-US" b="1" dirty="0">
-                <a:solidFill>
-                  <a:srgbClr val="FF0000"/>
-                </a:solidFill>
-                <a:latin typeface="Times New Roman" panose="02020603050405020304" pitchFamily="18" charset="0"/>
-                <a:cs typeface="Times New Roman" panose="02020603050405020304" pitchFamily="18" charset="0"/>
-              </a:rPr>
-              <a:t> to “false”</a:t>
+              <a:t> teleoperation</a:t>
             </a:r>
           </a:p>
         </p:txBody>
@@ -4588,7 +4731,17 @@
                 <a:latin typeface="Times New Roman" panose="02020603050405020304" pitchFamily="18" charset="0"/>
                 <a:cs typeface="Times New Roman" panose="02020603050405020304" pitchFamily="18" charset="0"/>
               </a:rPr>
-              <a:t>Enable the controller</a:t>
+              <a:t>Enable</a:t>
+            </a:r>
+            <a:r>
+              <a:rPr lang="en-US" dirty="0">
+                <a:solidFill>
+                  <a:srgbClr val="FF0000"/>
+                </a:solidFill>
+                <a:latin typeface="Times New Roman" panose="02020603050405020304" pitchFamily="18" charset="0"/>
+                <a:cs typeface="Times New Roman" panose="02020603050405020304" pitchFamily="18" charset="0"/>
+              </a:rPr>
+              <a:t> the controller</a:t>
             </a:r>
           </a:p>
         </p:txBody>

</xml_diff>